<commit_message>
fix syntax inconsistencies & update ppt
</commit_message>
<xml_diff>
--- a/typescript-workshop.pptx
+++ b/typescript-workshop.pptx
@@ -278,7 +278,7 @@
           <a:p>
             <a:fld id="{DA58075D-A17B-2341-AA61-E52913F51CC7}" type="datetimeFigureOut">
               <a:rPr lang="en-US" smtClean="0"/>
-              <a:t>12/10/19</a:t>
+              <a:t>2/19/20</a:t>
             </a:fld>
             <a:endParaRPr lang="en-US"/>
           </a:p>
@@ -478,7 +478,7 @@
           <a:p>
             <a:fld id="{DA58075D-A17B-2341-AA61-E52913F51CC7}" type="datetimeFigureOut">
               <a:rPr lang="en-US" smtClean="0"/>
-              <a:t>12/10/19</a:t>
+              <a:t>2/19/20</a:t>
             </a:fld>
             <a:endParaRPr lang="en-US"/>
           </a:p>
@@ -688,7 +688,7 @@
           <a:p>
             <a:fld id="{DA58075D-A17B-2341-AA61-E52913F51CC7}" type="datetimeFigureOut">
               <a:rPr lang="en-US" smtClean="0"/>
-              <a:t>12/10/19</a:t>
+              <a:t>2/19/20</a:t>
             </a:fld>
             <a:endParaRPr lang="en-US"/>
           </a:p>
@@ -888,7 +888,7 @@
           <a:p>
             <a:fld id="{DA58075D-A17B-2341-AA61-E52913F51CC7}" type="datetimeFigureOut">
               <a:rPr lang="en-US" smtClean="0"/>
-              <a:t>12/10/19</a:t>
+              <a:t>2/19/20</a:t>
             </a:fld>
             <a:endParaRPr lang="en-US"/>
           </a:p>
@@ -1164,7 +1164,7 @@
           <a:p>
             <a:fld id="{DA58075D-A17B-2341-AA61-E52913F51CC7}" type="datetimeFigureOut">
               <a:rPr lang="en-US" smtClean="0"/>
-              <a:t>12/10/19</a:t>
+              <a:t>2/19/20</a:t>
             </a:fld>
             <a:endParaRPr lang="en-US"/>
           </a:p>
@@ -1432,7 +1432,7 @@
           <a:p>
             <a:fld id="{DA58075D-A17B-2341-AA61-E52913F51CC7}" type="datetimeFigureOut">
               <a:rPr lang="en-US" smtClean="0"/>
-              <a:t>12/10/19</a:t>
+              <a:t>2/19/20</a:t>
             </a:fld>
             <a:endParaRPr lang="en-US"/>
           </a:p>
@@ -1847,7 +1847,7 @@
           <a:p>
             <a:fld id="{DA58075D-A17B-2341-AA61-E52913F51CC7}" type="datetimeFigureOut">
               <a:rPr lang="en-US" smtClean="0"/>
-              <a:t>12/10/19</a:t>
+              <a:t>2/19/20</a:t>
             </a:fld>
             <a:endParaRPr lang="en-US"/>
           </a:p>
@@ -1989,7 +1989,7 @@
           <a:p>
             <a:fld id="{DA58075D-A17B-2341-AA61-E52913F51CC7}" type="datetimeFigureOut">
               <a:rPr lang="en-US" smtClean="0"/>
-              <a:t>12/10/19</a:t>
+              <a:t>2/19/20</a:t>
             </a:fld>
             <a:endParaRPr lang="en-US"/>
           </a:p>
@@ -2102,7 +2102,7 @@
           <a:p>
             <a:fld id="{DA58075D-A17B-2341-AA61-E52913F51CC7}" type="datetimeFigureOut">
               <a:rPr lang="en-US" smtClean="0"/>
-              <a:t>12/10/19</a:t>
+              <a:t>2/19/20</a:t>
             </a:fld>
             <a:endParaRPr lang="en-US"/>
           </a:p>
@@ -2415,7 +2415,7 @@
           <a:p>
             <a:fld id="{DA58075D-A17B-2341-AA61-E52913F51CC7}" type="datetimeFigureOut">
               <a:rPr lang="en-US" smtClean="0"/>
-              <a:t>12/10/19</a:t>
+              <a:t>2/19/20</a:t>
             </a:fld>
             <a:endParaRPr lang="en-US"/>
           </a:p>
@@ -2704,7 +2704,7 @@
           <a:p>
             <a:fld id="{DA58075D-A17B-2341-AA61-E52913F51CC7}" type="datetimeFigureOut">
               <a:rPr lang="en-US" smtClean="0"/>
-              <a:t>12/10/19</a:t>
+              <a:t>2/19/20</a:t>
             </a:fld>
             <a:endParaRPr lang="en-US"/>
           </a:p>
@@ -2947,7 +2947,7 @@
           <a:p>
             <a:fld id="{DA58075D-A17B-2341-AA61-E52913F51CC7}" type="datetimeFigureOut">
               <a:rPr lang="en-US" smtClean="0"/>
-              <a:t>12/10/19</a:t>
+              <a:t>2/19/20</a:t>
             </a:fld>
             <a:endParaRPr lang="en-US"/>
           </a:p>
@@ -5082,7 +5082,7 @@
         <p:spPr/>
         <p:txBody>
           <a:bodyPr>
-            <a:normAutofit fontScale="92500" lnSpcReduction="10000"/>
+            <a:normAutofit fontScale="85000" lnSpcReduction="20000"/>
           </a:bodyPr>
           <a:lstStyle/>
           <a:p>
@@ -5129,12 +5129,25 @@
           <a:p>
             <a:r>
               <a:rPr lang="en-AU" dirty="0"/>
-              <a:t>What is TS!? </a:t>
+              <a:t>TypeScript tutorial (including some more TS features than I covered in this presentation): </a:t>
             </a:r>
             <a:r>
               <a:rPr lang="en-AU" dirty="0">
                 <a:hlinkClick r:id="rId4"/>
               </a:rPr>
+              <a:t>https://www.valentinog.com/blog/typescript/</a:t>
+            </a:r>
+            <a:endParaRPr lang="en-AU" dirty="0"/>
+          </a:p>
+          <a:p>
+            <a:r>
+              <a:rPr lang="en-AU" dirty="0"/>
+              <a:t>What is TS!? </a:t>
+            </a:r>
+            <a:r>
+              <a:rPr lang="en-AU" dirty="0">
+                <a:hlinkClick r:id="rId5"/>
+              </a:rPr>
               <a:t>https://medium.com/faun/typescript-what-2a1dbca374ce</a:t>
             </a:r>
             <a:endParaRPr lang="en-AU" dirty="0"/>
@@ -5146,7 +5159,7 @@
             </a:r>
             <a:r>
               <a:rPr lang="en-AU" dirty="0">
-                <a:hlinkClick r:id="rId5"/>
+                <a:hlinkClick r:id="rId6"/>
               </a:rPr>
               <a:t>https://medium.com/@jtomaszewski/why-typescript-is-the-best-way-to-write-front-end-in-2019-feb855f9b164</a:t>
             </a:r>
@@ -5214,10 +5227,9 @@
           <a:lstStyle/>
           <a:p>
             <a:r>
-              <a:rPr lang="en-US"/>
+              <a:rPr lang="en-US" dirty="0"/>
               <a:t>What is it?</a:t>
             </a:r>
-            <a:endParaRPr lang="en-US" dirty="0"/>
           </a:p>
         </p:txBody>
       </p:sp>
@@ -5250,23 +5262,22 @@
           <a:lstStyle/>
           <a:p>
             <a:r>
-              <a:rPr lang="en-US"/>
+              <a:rPr lang="en-US" dirty="0"/>
               <a:t>Superset of JavaScript</a:t>
             </a:r>
           </a:p>
           <a:p>
             <a:pPr lvl="1"/>
             <a:r>
-              <a:rPr lang="en-US"/>
+              <a:rPr lang="en-US" dirty="0"/>
               <a:t>JS is valid TS (but fails linting)</a:t>
             </a:r>
           </a:p>
           <a:p>
             <a:r>
-              <a:rPr lang="en-US"/>
+              <a:rPr lang="en-US" dirty="0"/>
               <a:t>TypeScript compiles down to JavaScript</a:t>
             </a:r>
-            <a:endParaRPr lang="en-US" dirty="0"/>
           </a:p>
         </p:txBody>
       </p:sp>
@@ -5698,7 +5709,7 @@
         </p:nvSpPr>
         <p:spPr>
           <a:xfrm>
-            <a:off x="1846955" y="3372180"/>
+            <a:off x="1810871" y="3372180"/>
             <a:ext cx="7593106" cy="732443"/>
           </a:xfrm>
           <a:prstGeom prst="rect">
@@ -6212,7 +6223,7 @@
           <a:p>
             <a:r>
               <a:rPr lang="en-US" dirty="0"/>
-              <a:t>Typed code is </a:t>
+              <a:t>Typed code is:</a:t>
             </a:r>
           </a:p>
           <a:p>
@@ -6257,7 +6268,7 @@
           <a:p>
             <a:r>
               <a:rPr lang="en-US" dirty="0"/>
-              <a:t>No longer need to make assumptions about</a:t>
+              <a:t>No longer need to make assumptions about:</a:t>
             </a:r>
           </a:p>
           <a:p>
@@ -6793,18 +6804,49 @@
         </p:spPr>
         <p:txBody>
           <a:bodyPr vert="horz" lIns="91440" tIns="45720" rIns="91440" bIns="45720" rtlCol="0">
-            <a:normAutofit/>
+            <a:normAutofit fontScale="92500" lnSpcReduction="10000"/>
           </a:bodyPr>
           <a:lstStyle/>
           <a:p>
             <a:pPr algn="ctr"/>
+            <a:r>
+              <a:rPr lang="en-US" sz="2400" kern="1200" dirty="0">
+                <a:solidFill>
+                  <a:schemeClr val="bg1"/>
+                </a:solidFill>
+                <a:latin typeface="+mn-lt"/>
+                <a:ea typeface="+mn-ea"/>
+                <a:cs typeface="+mn-cs"/>
+              </a:rPr>
+              <a:t>(see </a:t>
+            </a:r>
+            <a:r>
+              <a:rPr lang="en-AU" dirty="0">
+                <a:solidFill>
+                  <a:schemeClr val="bg1"/>
+                </a:solidFill>
+                <a:hlinkClick r:id="rId3">
+                  <a:extLst>
+                    <a:ext uri="{A12FA001-AC4F-418D-AE19-62706E023703}">
+                      <ahyp:hlinkClr xmlns:ahyp="http://schemas.microsoft.com/office/drawing/2018/hyperlinkcolor" val="tx"/>
+                    </a:ext>
+                  </a:extLst>
+                </a:hlinkClick>
+              </a:rPr>
+              <a:t>https://github.com/katiewoolston/typescript-workshop-example</a:t>
+            </a:r>
+            <a:r>
+              <a:rPr lang="en-AU" dirty="0">
+                <a:solidFill>
+                  <a:schemeClr val="bg1"/>
+                </a:solidFill>
+              </a:rPr>
+              <a:t>)</a:t>
+            </a:r>
             <a:endParaRPr lang="en-US" sz="2400" kern="1200" dirty="0">
               <a:solidFill>
-                <a:srgbClr val="FFFFFF"/>
+                <a:schemeClr val="bg1"/>
               </a:solidFill>
-              <a:latin typeface="+mn-lt"/>
-              <a:ea typeface="+mn-ea"/>
-              <a:cs typeface="+mn-cs"/>
             </a:endParaRPr>
           </a:p>
         </p:txBody>

</xml_diff>